<commit_message>
Updated Model and Refactoring
</commit_message>
<xml_diff>
--- a/orga/orga_Sprint_4_Presentation(Alpha).pptx
+++ b/orga/orga_Sprint_4_Presentation(Alpha).pptx
@@ -5,10 +5,10 @@
     <p:sldMasterId id="2147483738" r:id="rId1"/>
   </p:sldMasterIdLst>
   <p:notesMasterIdLst>
-    <p:notesMasterId r:id="rId20"/>
+    <p:notesMasterId r:id="rId19"/>
   </p:notesMasterIdLst>
   <p:handoutMasterIdLst>
-    <p:handoutMasterId r:id="rId21"/>
+    <p:handoutMasterId r:id="rId20"/>
   </p:handoutMasterIdLst>
   <p:sldIdLst>
     <p:sldId id="256" r:id="rId2"/>
@@ -18,17 +18,16 @@
     <p:sldId id="272" r:id="rId6"/>
     <p:sldId id="262" r:id="rId7"/>
     <p:sldId id="285" r:id="rId8"/>
-    <p:sldId id="286" r:id="rId9"/>
-    <p:sldId id="276" r:id="rId10"/>
-    <p:sldId id="281" r:id="rId11"/>
-    <p:sldId id="282" r:id="rId12"/>
-    <p:sldId id="267" r:id="rId13"/>
-    <p:sldId id="264" r:id="rId14"/>
-    <p:sldId id="284" r:id="rId15"/>
-    <p:sldId id="278" r:id="rId16"/>
-    <p:sldId id="279" r:id="rId17"/>
-    <p:sldId id="280" r:id="rId18"/>
-    <p:sldId id="269" r:id="rId19"/>
+    <p:sldId id="276" r:id="rId9"/>
+    <p:sldId id="281" r:id="rId10"/>
+    <p:sldId id="282" r:id="rId11"/>
+    <p:sldId id="267" r:id="rId12"/>
+    <p:sldId id="264" r:id="rId13"/>
+    <p:sldId id="284" r:id="rId14"/>
+    <p:sldId id="278" r:id="rId15"/>
+    <p:sldId id="279" r:id="rId16"/>
+    <p:sldId id="280" r:id="rId17"/>
+    <p:sldId id="269" r:id="rId18"/>
   </p:sldIdLst>
   <p:sldSz cx="12192000" cy="6858000"/>
   <p:notesSz cx="7099300" cy="10234613"/>
@@ -407,7 +406,7 @@
               <a:pPr>
                 <a:defRPr/>
               </a:pPr>
-              <a:t>‹Nr.›</a:t>
+              <a:t>‹#›</a:t>
             </a:fld>
             <a:endParaRPr lang="de-DE" sz="1000" dirty="0">
               <a:latin typeface="Arial" pitchFamily="34" charset="0"/>
@@ -722,7 +721,7 @@
               <a:pPr>
                 <a:defRPr/>
               </a:pPr>
-              <a:t>‹Nr.›</a:t>
+              <a:t>‹#›</a:t>
             </a:fld>
             <a:endParaRPr lang="de-DE" dirty="0"/>
           </a:p>
@@ -2047,7 +2046,7 @@
             <a:fld id="{4506F84E-75D2-4715-B6C6-C971E49CE21A}" type="slidenum">
               <a:rPr lang="de-DE" smtClean="0"/>
               <a:pPr/>
-              <a:t>‹Nr.›</a:t>
+              <a:t>‹#›</a:t>
             </a:fld>
             <a:endParaRPr lang="de-DE" dirty="0"/>
           </a:p>
@@ -2276,7 +2275,7 @@
             <a:fld id="{4506F84E-75D2-4715-B6C6-C971E49CE21A}" type="slidenum">
               <a:rPr lang="de-DE" smtClean="0"/>
               <a:pPr/>
-              <a:t>‹Nr.›</a:t>
+              <a:t>‹#›</a:t>
             </a:fld>
             <a:endParaRPr lang="de-DE" dirty="0"/>
           </a:p>
@@ -2410,7 +2409,7 @@
             <a:fld id="{4506F84E-75D2-4715-B6C6-C971E49CE21A}" type="slidenum">
               <a:rPr lang="de-DE" smtClean="0"/>
               <a:pPr/>
-              <a:t>‹Nr.›</a:t>
+              <a:t>‹#›</a:t>
             </a:fld>
             <a:endParaRPr lang="de-DE" dirty="0"/>
           </a:p>
@@ -2544,7 +2543,7 @@
             <a:fld id="{4506F84E-75D2-4715-B6C6-C971E49CE21A}" type="slidenum">
               <a:rPr lang="de-DE" smtClean="0"/>
               <a:pPr/>
-              <a:t>‹Nr.›</a:t>
+              <a:t>‹#›</a:t>
             </a:fld>
             <a:endParaRPr lang="de-DE" dirty="0"/>
           </a:p>
@@ -2733,7 +2732,7 @@
             <a:fld id="{4506F84E-75D2-4715-B6C6-C971E49CE21A}" type="slidenum">
               <a:rPr lang="de-DE" smtClean="0"/>
               <a:pPr/>
-              <a:t>‹Nr.›</a:t>
+              <a:t>‹#›</a:t>
             </a:fld>
             <a:endParaRPr lang="de-DE" dirty="0"/>
           </a:p>
@@ -2922,7 +2921,7 @@
             <a:fld id="{4506F84E-75D2-4715-B6C6-C971E49CE21A}" type="slidenum">
               <a:rPr lang="de-DE" smtClean="0"/>
               <a:pPr/>
-              <a:t>‹Nr.›</a:t>
+              <a:t>‹#›</a:t>
             </a:fld>
             <a:endParaRPr lang="de-DE" dirty="0"/>
           </a:p>
@@ -3111,7 +3110,7 @@
             <a:fld id="{4506F84E-75D2-4715-B6C6-C971E49CE21A}" type="slidenum">
               <a:rPr lang="de-DE" smtClean="0"/>
               <a:pPr/>
-              <a:t>‹Nr.›</a:t>
+              <a:t>‹#›</a:t>
             </a:fld>
             <a:endParaRPr lang="de-DE" dirty="0"/>
           </a:p>
@@ -3283,7 +3282,7 @@
             <a:fld id="{4506F84E-75D2-4715-B6C6-C971E49CE21A}" type="slidenum">
               <a:rPr lang="de-DE" smtClean="0"/>
               <a:pPr/>
-              <a:t>‹Nr.›</a:t>
+              <a:t>‹#›</a:t>
             </a:fld>
             <a:endParaRPr lang="de-DE" dirty="0"/>
           </a:p>
@@ -4168,7 +4167,7 @@
       </p:grpSpPr>
       <p:sp>
         <p:nvSpPr>
-          <p:cNvPr id="5" name="Title 4"/>
+          <p:cNvPr id="2" name="Titel 1"/>
           <p:cNvSpPr>
             <a:spLocks noGrp="1"/>
           </p:cNvSpPr>
@@ -4182,7 +4181,7 @@
           <a:lstStyle/>
           <a:p>
             <a:r>
-              <a:rPr lang="en-US" dirty="0"/>
+              <a:rPr lang="de-DE" dirty="0"/>
               <a:t>API</a:t>
             </a:r>
           </a:p>
@@ -4190,12 +4189,101 @@
       </p:sp>
       <p:sp>
         <p:nvSpPr>
-          <p:cNvPr id="6" name="Content Placeholder 5"/>
+          <p:cNvPr id="3" name="Inhaltsplatzhalter 2"/>
           <p:cNvSpPr>
             <a:spLocks noGrp="1"/>
           </p:cNvSpPr>
           <p:nvPr>
             <p:ph sz="quarter" idx="12"/>
+          </p:nvPr>
+        </p:nvSpPr>
+        <p:spPr/>
+        <p:txBody>
+          <a:bodyPr>
+            <a:normAutofit/>
+          </a:bodyPr>
+          <a:lstStyle/>
+          <a:p>
+            <a:pPr marL="457200" indent="-457200">
+              <a:buFont typeface="Arial" panose="020B0604020202020204" pitchFamily="34" charset="0"/>
+              <a:buChar char="•"/>
+            </a:pPr>
+            <a:r>
+              <a:rPr lang="de-DE" sz="2000" dirty="0"/>
+              <a:t>Code hinter Endpunkten geschrieben</a:t>
+            </a:r>
+          </a:p>
+          <a:p>
+            <a:pPr marL="457200" indent="-457200">
+              <a:buFont typeface="Arial" panose="020B0604020202020204" pitchFamily="34" charset="0"/>
+              <a:buChar char="•"/>
+            </a:pPr>
+            <a:r>
+              <a:rPr lang="de-DE" sz="2000" dirty="0"/>
+              <a:t>Anbindung von Frontend zu Backend</a:t>
+            </a:r>
+          </a:p>
+          <a:p>
+            <a:pPr marL="457200" indent="-457200">
+              <a:buFont typeface="Arial" panose="020B0604020202020204" pitchFamily="34" charset="0"/>
+              <a:buChar char="•"/>
+            </a:pPr>
+            <a:r>
+              <a:rPr lang="de-DE" sz="2000" dirty="0" err="1"/>
+              <a:t>Dockerized</a:t>
+            </a:r>
+            <a:endParaRPr lang="de-DE" sz="2000" dirty="0"/>
+          </a:p>
+          <a:p>
+            <a:pPr marL="457200" indent="-457200">
+              <a:buFont typeface="Arial" panose="020B0604020202020204" pitchFamily="34" charset="0"/>
+              <a:buChar char="•"/>
+            </a:pPr>
+            <a:r>
+              <a:rPr lang="de-DE" sz="2000" dirty="0" err="1"/>
+              <a:t>Async</a:t>
+            </a:r>
+            <a:r>
+              <a:rPr lang="de-DE" sz="2000" dirty="0"/>
+              <a:t> Import </a:t>
+            </a:r>
+            <a:r>
+              <a:rPr lang="de-DE" sz="2000" dirty="0" err="1"/>
+              <a:t>and</a:t>
+            </a:r>
+            <a:r>
+              <a:rPr lang="de-DE" sz="2000" dirty="0"/>
+              <a:t> Export</a:t>
+            </a:r>
+          </a:p>
+          <a:p>
+            <a:pPr marL="457200" indent="-457200">
+              <a:buFont typeface="Arial" panose="020B0604020202020204" pitchFamily="34" charset="0"/>
+              <a:buChar char="•"/>
+            </a:pPr>
+            <a:r>
+              <a:rPr lang="de-DE" sz="2000" dirty="0"/>
+              <a:t>Hohe </a:t>
+            </a:r>
+            <a:r>
+              <a:rPr lang="de-DE" sz="2000" dirty="0" err="1"/>
+              <a:t>load</a:t>
+            </a:r>
+            <a:r>
+              <a:rPr lang="de-DE" sz="2000" dirty="0"/>
+              <a:t> möglich</a:t>
+            </a:r>
+          </a:p>
+        </p:txBody>
+      </p:sp>
+      <p:sp>
+        <p:nvSpPr>
+          <p:cNvPr id="4" name="Fußzeilenplatzhalter 3"/>
+          <p:cNvSpPr>
+            <a:spLocks noGrp="1"/>
+          </p:cNvSpPr>
+          <p:nvPr>
+            <p:ph type="ftr" sz="quarter" idx="13"/>
           </p:nvPr>
         </p:nvSpPr>
         <p:spPr/>
@@ -4203,76 +4291,14 @@
           <a:bodyPr/>
           <a:lstStyle/>
           <a:p>
-            <a:pPr marL="0" lvl="1" indent="0">
-              <a:buNone/>
-            </a:pPr>
-            <a:r>
-              <a:rPr lang="en-US" dirty="0"/>
-              <a:t> Swagger </a:t>
-            </a:r>
-            <a:r>
-              <a:rPr lang="en-US" dirty="0" err="1"/>
-              <a:t>Doku</a:t>
-            </a:r>
-            <a:endParaRPr lang="en-US" dirty="0"/>
-          </a:p>
-          <a:p>
-            <a:pPr marL="0" lvl="1" indent="0">
-              <a:buNone/>
-            </a:pPr>
-            <a:endParaRPr lang="en-US" dirty="0"/>
-          </a:p>
-          <a:p>
-            <a:pPr marL="0" lvl="1" indent="0">
-              <a:buNone/>
-            </a:pPr>
-            <a:r>
-              <a:rPr lang="en-US" dirty="0"/>
-              <a:t>                                                                                                               </a:t>
-            </a:r>
-          </a:p>
-          <a:p>
-            <a:pPr marL="0" lvl="1" indent="0">
-              <a:buNone/>
-            </a:pPr>
-            <a:r>
-              <a:rPr lang="en-US" dirty="0"/>
-              <a:t>                                                                                                                                                                          </a:t>
-            </a:r>
-          </a:p>
-          <a:p>
-            <a:pPr marL="0" lvl="1" indent="0">
-              <a:buNone/>
-            </a:pPr>
-            <a:r>
-              <a:rPr lang="en-US" dirty="0"/>
-              <a:t>                                                                                                         </a:t>
-            </a:r>
-          </a:p>
-        </p:txBody>
-      </p:sp>
-      <p:sp>
-        <p:nvSpPr>
-          <p:cNvPr id="3" name="Footer Placeholder 2"/>
-          <p:cNvSpPr>
-            <a:spLocks noGrp="1"/>
-          </p:cNvSpPr>
-          <p:nvPr>
-            <p:ph type="ftr" sz="quarter" idx="13"/>
-          </p:nvPr>
-        </p:nvSpPr>
-        <p:spPr/>
-        <p:txBody>
-          <a:bodyPr/>
-          <a:lstStyle/>
-          <a:p>
+            <a:pPr algn="l"/>
             <a:endParaRPr lang="de-DE" dirty="0"/>
           </a:p>
         </p:txBody>
       </p:sp>
       <p:sp>
         <p:nvSpPr>
-          <p:cNvPr id="4" name="Slide Number Placeholder 3"/>
+          <p:cNvPr id="5" name="Foliennummernplatzhalter 4"/>
           <p:cNvSpPr>
             <a:spLocks noGrp="1"/>
           </p:cNvSpPr>
@@ -4294,40 +4320,10 @@
           </a:p>
         </p:txBody>
       </p:sp>
-      <p:pic>
-        <p:nvPicPr>
-          <p:cNvPr id="7" name="Grafik 6"/>
-          <p:cNvPicPr>
-            <a:picLocks noChangeAspect="1"/>
-          </p:cNvPicPr>
-          <p:nvPr/>
-        </p:nvPicPr>
-        <p:blipFill>
-          <a:blip r:embed="rId2" cstate="print">
-            <a:extLst>
-              <a:ext uri="{28A0092B-C50C-407E-A947-70E740481C1C}">
-                <a14:useLocalDpi xmlns:a14="http://schemas.microsoft.com/office/drawing/2010/main" val="0"/>
-              </a:ext>
-            </a:extLst>
-          </a:blip>
-          <a:stretch>
-            <a:fillRect/>
-          </a:stretch>
-        </p:blipFill>
-        <p:spPr>
-          <a:xfrm>
-            <a:off x="352904" y="1380930"/>
-            <a:ext cx="8822198" cy="4414342"/>
-          </a:xfrm>
-          <a:prstGeom prst="rect">
-            <a:avLst/>
-          </a:prstGeom>
-        </p:spPr>
-      </p:pic>
     </p:spTree>
     <p:extLst>
       <p:ext uri="{BB962C8B-B14F-4D97-AF65-F5344CB8AC3E}">
-        <p14:creationId xmlns:p14="http://schemas.microsoft.com/office/powerpoint/2010/main" val="780322075"/>
+        <p14:creationId xmlns:p14="http://schemas.microsoft.com/office/powerpoint/2010/main" val="3526108726"/>
       </p:ext>
     </p:extLst>
   </p:cSld>
@@ -4361,158 +4357,38 @@
             <a:spLocks noGrp="1"/>
           </p:cNvSpPr>
           <p:nvPr>
-            <p:ph type="title"/>
-          </p:nvPr>
-        </p:nvSpPr>
-        <p:spPr/>
+            <p:ph type="ctrTitle"/>
+          </p:nvPr>
+        </p:nvSpPr>
+        <p:spPr>
+          <a:xfrm>
+            <a:off x="384000" y="2487600"/>
+            <a:ext cx="11424000" cy="443198"/>
+          </a:xfrm>
+        </p:spPr>
         <p:txBody>
           <a:bodyPr/>
           <a:lstStyle/>
           <a:p>
             <a:r>
-              <a:rPr lang="de-DE" dirty="0"/>
-              <a:t>API</a:t>
-            </a:r>
-          </a:p>
-        </p:txBody>
-      </p:sp>
-      <p:sp>
-        <p:nvSpPr>
-          <p:cNvPr id="3" name="Inhaltsplatzhalter 2"/>
-          <p:cNvSpPr>
-            <a:spLocks noGrp="1"/>
-          </p:cNvSpPr>
-          <p:nvPr>
-            <p:ph sz="quarter" idx="12"/>
-          </p:nvPr>
-        </p:nvSpPr>
-        <p:spPr/>
-        <p:txBody>
-          <a:bodyPr>
-            <a:normAutofit/>
-          </a:bodyPr>
-          <a:lstStyle/>
-          <a:p>
-            <a:pPr marL="457200" indent="-457200">
-              <a:buFont typeface="Arial" panose="020B0604020202020204" pitchFamily="34" charset="0"/>
-              <a:buChar char="•"/>
-            </a:pPr>
-            <a:r>
-              <a:rPr lang="de-DE" sz="2000" dirty="0"/>
-              <a:t>Code hinter Endpunkten geschrieben</a:t>
-            </a:r>
-          </a:p>
-          <a:p>
-            <a:pPr marL="457200" indent="-457200">
-              <a:buFont typeface="Arial" panose="020B0604020202020204" pitchFamily="34" charset="0"/>
-              <a:buChar char="•"/>
-            </a:pPr>
-            <a:r>
-              <a:rPr lang="de-DE" sz="2000" dirty="0"/>
-              <a:t>Anbindung von Frontend zu Backend</a:t>
-            </a:r>
-          </a:p>
-          <a:p>
-            <a:pPr marL="457200" indent="-457200">
-              <a:buFont typeface="Arial" panose="020B0604020202020204" pitchFamily="34" charset="0"/>
-              <a:buChar char="•"/>
-            </a:pPr>
-            <a:r>
-              <a:rPr lang="de-DE" sz="2000" dirty="0" err="1"/>
-              <a:t>Dockerized</a:t>
-            </a:r>
-            <a:endParaRPr lang="de-DE" sz="2000" dirty="0"/>
-          </a:p>
-          <a:p>
-            <a:pPr marL="457200" indent="-457200">
-              <a:buFont typeface="Arial" panose="020B0604020202020204" pitchFamily="34" charset="0"/>
-              <a:buChar char="•"/>
-            </a:pPr>
-            <a:r>
-              <a:rPr lang="de-DE" sz="2000" dirty="0" err="1"/>
-              <a:t>Async</a:t>
-            </a:r>
-            <a:r>
-              <a:rPr lang="de-DE" sz="2000" dirty="0"/>
-              <a:t> Import </a:t>
-            </a:r>
-            <a:r>
-              <a:rPr lang="de-DE" sz="2000" dirty="0" err="1"/>
-              <a:t>and</a:t>
-            </a:r>
-            <a:r>
-              <a:rPr lang="de-DE" sz="2000" dirty="0"/>
-              <a:t> Export</a:t>
-            </a:r>
-          </a:p>
-          <a:p>
-            <a:pPr marL="457200" indent="-457200">
-              <a:buFont typeface="Arial" panose="020B0604020202020204" pitchFamily="34" charset="0"/>
-              <a:buChar char="•"/>
-            </a:pPr>
-            <a:r>
-              <a:rPr lang="de-DE" sz="2000" dirty="0"/>
-              <a:t>Hohe </a:t>
-            </a:r>
-            <a:r>
-              <a:rPr lang="de-DE" sz="2000" dirty="0" err="1"/>
-              <a:t>load</a:t>
-            </a:r>
-            <a:r>
-              <a:rPr lang="de-DE" sz="2000" dirty="0"/>
-              <a:t> möglich</a:t>
-            </a:r>
-          </a:p>
-        </p:txBody>
-      </p:sp>
-      <p:sp>
-        <p:nvSpPr>
-          <p:cNvPr id="4" name="Fußzeilenplatzhalter 3"/>
-          <p:cNvSpPr>
-            <a:spLocks noGrp="1"/>
-          </p:cNvSpPr>
-          <p:nvPr>
-            <p:ph type="ftr" sz="quarter" idx="13"/>
-          </p:nvPr>
-        </p:nvSpPr>
-        <p:spPr/>
-        <p:txBody>
-          <a:bodyPr/>
-          <a:lstStyle/>
-          <a:p>
-            <a:pPr algn="l"/>
-            <a:endParaRPr lang="de-DE" dirty="0"/>
-          </a:p>
-        </p:txBody>
-      </p:sp>
-      <p:sp>
-        <p:nvSpPr>
-          <p:cNvPr id="5" name="Foliennummernplatzhalter 4"/>
-          <p:cNvSpPr>
-            <a:spLocks noGrp="1"/>
-          </p:cNvSpPr>
-          <p:nvPr>
-            <p:ph type="sldNum" sz="quarter" idx="14"/>
-          </p:nvPr>
-        </p:nvSpPr>
-        <p:spPr/>
-        <p:txBody>
-          <a:bodyPr/>
-          <a:lstStyle/>
-          <a:p>
-            <a:fld id="{4506F84E-75D2-4715-B6C6-C971E49CE21A}" type="slidenum">
-              <a:rPr lang="de-DE" smtClean="0"/>
-              <a:pPr/>
-              <a:t>11</a:t>
-            </a:fld>
-            <a:endParaRPr lang="de-DE" dirty="0"/>
+              <a:rPr lang="en-US" dirty="0"/>
+              <a:t>Backend (+ </a:t>
+            </a:r>
+            <a:r>
+              <a:rPr lang="en-US" dirty="0" err="1"/>
+              <a:t>Datenbank</a:t>
+            </a:r>
+            <a:r>
+              <a:rPr lang="en-US" dirty="0"/>
+              <a:t>)</a:t>
+            </a:r>
           </a:p>
         </p:txBody>
       </p:sp>
     </p:spTree>
     <p:extLst>
       <p:ext uri="{BB962C8B-B14F-4D97-AF65-F5344CB8AC3E}">
-        <p14:creationId xmlns:p14="http://schemas.microsoft.com/office/powerpoint/2010/main" val="3526108726"/>
+        <p14:creationId xmlns:p14="http://schemas.microsoft.com/office/powerpoint/2010/main" val="3331473797"/>
       </p:ext>
     </p:extLst>
   </p:cSld>
@@ -4541,43 +4417,216 @@
       </p:grpSpPr>
       <p:sp>
         <p:nvSpPr>
-          <p:cNvPr id="2" name="Titel 1"/>
+          <p:cNvPr id="5" name="Title 4"/>
           <p:cNvSpPr>
             <a:spLocks noGrp="1"/>
           </p:cNvSpPr>
           <p:nvPr>
-            <p:ph type="ctrTitle"/>
-          </p:nvPr>
-        </p:nvSpPr>
-        <p:spPr>
-          <a:xfrm>
-            <a:off x="384000" y="2487600"/>
-            <a:ext cx="11424000" cy="443198"/>
-          </a:xfrm>
-        </p:spPr>
+            <p:ph type="title"/>
+          </p:nvPr>
+        </p:nvSpPr>
+        <p:spPr/>
         <p:txBody>
           <a:bodyPr/>
           <a:lstStyle/>
           <a:p>
             <a:r>
               <a:rPr lang="en-US" dirty="0"/>
-              <a:t>Backend (+ </a:t>
+              <a:t>Backend Microservices </a:t>
+            </a:r>
+          </a:p>
+        </p:txBody>
+      </p:sp>
+      <p:sp>
+        <p:nvSpPr>
+          <p:cNvPr id="6" name="Content Placeholder 5"/>
+          <p:cNvSpPr>
+            <a:spLocks noGrp="1"/>
+          </p:cNvSpPr>
+          <p:nvPr>
+            <p:ph sz="quarter" idx="12"/>
+          </p:nvPr>
+        </p:nvSpPr>
+        <p:spPr/>
+        <p:txBody>
+          <a:bodyPr/>
+          <a:lstStyle/>
+          <a:p>
+            <a:pPr lvl="1"/>
+            <a:r>
+              <a:rPr lang="en-US" b="1" dirty="0"/>
+              <a:t>Importer:</a:t>
+            </a:r>
+          </a:p>
+          <a:p>
+            <a:pPr lvl="2"/>
+            <a:r>
+              <a:rPr lang="en-US" dirty="0"/>
+              <a:t>RESTful </a:t>
+            </a:r>
+            <a:r>
+              <a:rPr lang="en-US" dirty="0" err="1"/>
+              <a:t>Schnittstellen</a:t>
+            </a:r>
+            <a:r>
+              <a:rPr lang="en-US" dirty="0"/>
+              <a:t> </a:t>
+            </a:r>
+            <a:r>
+              <a:rPr lang="en-US" dirty="0" err="1"/>
+              <a:t>für</a:t>
+            </a:r>
+            <a:r>
+              <a:rPr lang="en-US" dirty="0"/>
+              <a:t> Import, Update, Delete von Tests</a:t>
+            </a:r>
+          </a:p>
+          <a:p>
+            <a:pPr lvl="2"/>
+            <a:endParaRPr lang="en-US" dirty="0"/>
+          </a:p>
+          <a:p>
+            <a:pPr lvl="1"/>
+            <a:r>
+              <a:rPr lang="en-US" b="1" dirty="0"/>
+              <a:t>Exporter:</a:t>
+            </a:r>
+          </a:p>
+          <a:p>
+            <a:pPr lvl="2"/>
+            <a:r>
+              <a:rPr lang="en-US" dirty="0"/>
+              <a:t>RESTful </a:t>
+            </a:r>
+            <a:r>
+              <a:rPr lang="en-US" dirty="0" err="1"/>
+              <a:t>Schnistellen</a:t>
+            </a:r>
+            <a:r>
+              <a:rPr lang="en-US" dirty="0"/>
+              <a:t> Export von Tests</a:t>
+            </a:r>
+          </a:p>
+          <a:p>
+            <a:pPr lvl="1"/>
+            <a:endParaRPr lang="en-US" dirty="0"/>
+          </a:p>
+          <a:p>
+            <a:pPr lvl="1"/>
+            <a:r>
+              <a:rPr lang="en-US" b="1" dirty="0"/>
+              <a:t>Database API: </a:t>
+            </a:r>
+          </a:p>
+          <a:p>
+            <a:pPr lvl="2"/>
+            <a:r>
+              <a:rPr lang="en-US" dirty="0"/>
+              <a:t>RESTful </a:t>
+            </a:r>
+            <a:r>
+              <a:rPr lang="en-US" dirty="0" err="1"/>
+              <a:t>Schnittstellen</a:t>
+            </a:r>
+            <a:r>
+              <a:rPr lang="en-US" dirty="0"/>
+              <a:t> </a:t>
+            </a:r>
+            <a:r>
+              <a:rPr lang="en-US" dirty="0" err="1"/>
+              <a:t>für</a:t>
+            </a:r>
+            <a:r>
+              <a:rPr lang="en-US" dirty="0"/>
+              <a:t> </a:t>
+            </a:r>
+            <a:r>
+              <a:rPr lang="en-US" dirty="0" err="1"/>
+              <a:t>Speichern</a:t>
+            </a:r>
+            <a:r>
+              <a:rPr lang="en-US" dirty="0"/>
+              <a:t> und </a:t>
+            </a:r>
+            <a:r>
+              <a:rPr lang="en-US" dirty="0" err="1"/>
+              <a:t>Lesen</a:t>
+            </a:r>
+            <a:r>
+              <a:rPr lang="en-US" dirty="0"/>
+              <a:t> von Tests in MySQL </a:t>
             </a:r>
             <a:r>
               <a:rPr lang="en-US" dirty="0" err="1"/>
               <a:t>Datenbank</a:t>
             </a:r>
-            <a:r>
-              <a:rPr lang="en-US" dirty="0"/>
-              <a:t>)</a:t>
-            </a:r>
+            <a:endParaRPr lang="en-US" dirty="0"/>
+          </a:p>
+          <a:p>
+            <a:pPr lvl="2"/>
+            <a:endParaRPr lang="en-US" dirty="0"/>
+          </a:p>
+          <a:p>
+            <a:pPr lvl="1"/>
+            <a:r>
+              <a:rPr lang="en-US" b="1" dirty="0"/>
+              <a:t>Swagger </a:t>
+            </a:r>
+            <a:r>
+              <a:rPr lang="en-US" b="1" dirty="0" err="1"/>
+              <a:t>Dokumentation</a:t>
+            </a:r>
+            <a:endParaRPr lang="en-US" b="1" dirty="0"/>
+          </a:p>
+        </p:txBody>
+      </p:sp>
+      <p:sp>
+        <p:nvSpPr>
+          <p:cNvPr id="3" name="Footer Placeholder 2"/>
+          <p:cNvSpPr>
+            <a:spLocks noGrp="1"/>
+          </p:cNvSpPr>
+          <p:nvPr>
+            <p:ph type="ftr" sz="quarter" idx="13"/>
+          </p:nvPr>
+        </p:nvSpPr>
+        <p:spPr/>
+        <p:txBody>
+          <a:bodyPr/>
+          <a:lstStyle/>
+          <a:p>
+            <a:endParaRPr lang="de-DE" dirty="0"/>
+          </a:p>
+        </p:txBody>
+      </p:sp>
+      <p:sp>
+        <p:nvSpPr>
+          <p:cNvPr id="4" name="Slide Number Placeholder 3"/>
+          <p:cNvSpPr>
+            <a:spLocks noGrp="1"/>
+          </p:cNvSpPr>
+          <p:nvPr>
+            <p:ph type="sldNum" sz="quarter" idx="14"/>
+          </p:nvPr>
+        </p:nvSpPr>
+        <p:spPr/>
+        <p:txBody>
+          <a:bodyPr/>
+          <a:lstStyle/>
+          <a:p>
+            <a:fld id="{4506F84E-75D2-4715-B6C6-C971E49CE21A}" type="slidenum">
+              <a:rPr lang="de-DE" smtClean="0"/>
+              <a:pPr/>
+              <a:t>12</a:t>
+            </a:fld>
+            <a:endParaRPr lang="de-DE" dirty="0"/>
           </a:p>
         </p:txBody>
       </p:sp>
     </p:spTree>
     <p:extLst>
       <p:ext uri="{BB962C8B-B14F-4D97-AF65-F5344CB8AC3E}">
-        <p14:creationId xmlns:p14="http://schemas.microsoft.com/office/powerpoint/2010/main" val="3331473797"/>
+        <p14:creationId xmlns:p14="http://schemas.microsoft.com/office/powerpoint/2010/main" val="361520676"/>
       </p:ext>
     </p:extLst>
   </p:cSld>
@@ -4606,244 +4655,6 @@
       </p:grpSpPr>
       <p:sp>
         <p:nvSpPr>
-          <p:cNvPr id="5" name="Title 4"/>
-          <p:cNvSpPr>
-            <a:spLocks noGrp="1"/>
-          </p:cNvSpPr>
-          <p:nvPr>
-            <p:ph type="title"/>
-          </p:nvPr>
-        </p:nvSpPr>
-        <p:spPr/>
-        <p:txBody>
-          <a:bodyPr/>
-          <a:lstStyle/>
-          <a:p>
-            <a:r>
-              <a:rPr lang="en-US" dirty="0"/>
-              <a:t>Backend Microservices </a:t>
-            </a:r>
-          </a:p>
-        </p:txBody>
-      </p:sp>
-      <p:sp>
-        <p:nvSpPr>
-          <p:cNvPr id="6" name="Content Placeholder 5"/>
-          <p:cNvSpPr>
-            <a:spLocks noGrp="1"/>
-          </p:cNvSpPr>
-          <p:nvPr>
-            <p:ph sz="quarter" idx="12"/>
-          </p:nvPr>
-        </p:nvSpPr>
-        <p:spPr/>
-        <p:txBody>
-          <a:bodyPr/>
-          <a:lstStyle/>
-          <a:p>
-            <a:pPr lvl="1"/>
-            <a:r>
-              <a:rPr lang="en-US" b="1" dirty="0"/>
-              <a:t>Importer:</a:t>
-            </a:r>
-          </a:p>
-          <a:p>
-            <a:pPr lvl="2"/>
-            <a:r>
-              <a:rPr lang="en-US" dirty="0"/>
-              <a:t>RESTful </a:t>
-            </a:r>
-            <a:r>
-              <a:rPr lang="en-US" dirty="0" err="1"/>
-              <a:t>Schnittstellen</a:t>
-            </a:r>
-            <a:r>
-              <a:rPr lang="en-US" dirty="0"/>
-              <a:t> </a:t>
-            </a:r>
-            <a:r>
-              <a:rPr lang="en-US" dirty="0" err="1"/>
-              <a:t>für</a:t>
-            </a:r>
-            <a:r>
-              <a:rPr lang="en-US" dirty="0"/>
-              <a:t> Import, Update, Delete von Tests</a:t>
-            </a:r>
-          </a:p>
-          <a:p>
-            <a:pPr lvl="2"/>
-            <a:endParaRPr lang="en-US" dirty="0"/>
-          </a:p>
-          <a:p>
-            <a:pPr lvl="1"/>
-            <a:r>
-              <a:rPr lang="en-US" b="1" dirty="0"/>
-              <a:t>Exporter:</a:t>
-            </a:r>
-          </a:p>
-          <a:p>
-            <a:pPr lvl="2"/>
-            <a:r>
-              <a:rPr lang="en-US" dirty="0"/>
-              <a:t>RESTful </a:t>
-            </a:r>
-            <a:r>
-              <a:rPr lang="en-US" dirty="0" err="1"/>
-              <a:t>Schnistellen</a:t>
-            </a:r>
-            <a:r>
-              <a:rPr lang="en-US" dirty="0"/>
-              <a:t> Export von Tests</a:t>
-            </a:r>
-          </a:p>
-          <a:p>
-            <a:pPr lvl="1"/>
-            <a:endParaRPr lang="en-US" dirty="0"/>
-          </a:p>
-          <a:p>
-            <a:pPr lvl="1"/>
-            <a:r>
-              <a:rPr lang="en-US" b="1" dirty="0"/>
-              <a:t>Database API: </a:t>
-            </a:r>
-          </a:p>
-          <a:p>
-            <a:pPr lvl="2"/>
-            <a:r>
-              <a:rPr lang="en-US" dirty="0"/>
-              <a:t>RESTful </a:t>
-            </a:r>
-            <a:r>
-              <a:rPr lang="en-US" dirty="0" err="1"/>
-              <a:t>Schnittstellen</a:t>
-            </a:r>
-            <a:r>
-              <a:rPr lang="en-US" dirty="0"/>
-              <a:t> </a:t>
-            </a:r>
-            <a:r>
-              <a:rPr lang="en-US" dirty="0" err="1"/>
-              <a:t>für</a:t>
-            </a:r>
-            <a:r>
-              <a:rPr lang="en-US" dirty="0"/>
-              <a:t> </a:t>
-            </a:r>
-            <a:r>
-              <a:rPr lang="en-US" dirty="0" err="1"/>
-              <a:t>Speichern</a:t>
-            </a:r>
-            <a:r>
-              <a:rPr lang="en-US" dirty="0"/>
-              <a:t> und </a:t>
-            </a:r>
-            <a:r>
-              <a:rPr lang="en-US" dirty="0" err="1"/>
-              <a:t>Lesen</a:t>
-            </a:r>
-            <a:r>
-              <a:rPr lang="en-US" dirty="0"/>
-              <a:t> von Tests in MySQL </a:t>
-            </a:r>
-            <a:r>
-              <a:rPr lang="en-US" dirty="0" err="1"/>
-              <a:t>Datenbank</a:t>
-            </a:r>
-            <a:endParaRPr lang="en-US" dirty="0"/>
-          </a:p>
-          <a:p>
-            <a:pPr lvl="2"/>
-            <a:endParaRPr lang="en-US" dirty="0"/>
-          </a:p>
-          <a:p>
-            <a:pPr lvl="1"/>
-            <a:r>
-              <a:rPr lang="en-US" b="1" dirty="0"/>
-              <a:t>Swagger </a:t>
-            </a:r>
-            <a:r>
-              <a:rPr lang="en-US" b="1" dirty="0" err="1"/>
-              <a:t>Dokumentation</a:t>
-            </a:r>
-            <a:endParaRPr lang="en-US" b="1" dirty="0"/>
-          </a:p>
-        </p:txBody>
-      </p:sp>
-      <p:sp>
-        <p:nvSpPr>
-          <p:cNvPr id="3" name="Footer Placeholder 2"/>
-          <p:cNvSpPr>
-            <a:spLocks noGrp="1"/>
-          </p:cNvSpPr>
-          <p:nvPr>
-            <p:ph type="ftr" sz="quarter" idx="13"/>
-          </p:nvPr>
-        </p:nvSpPr>
-        <p:spPr/>
-        <p:txBody>
-          <a:bodyPr/>
-          <a:lstStyle/>
-          <a:p>
-            <a:endParaRPr lang="de-DE" dirty="0"/>
-          </a:p>
-        </p:txBody>
-      </p:sp>
-      <p:sp>
-        <p:nvSpPr>
-          <p:cNvPr id="4" name="Slide Number Placeholder 3"/>
-          <p:cNvSpPr>
-            <a:spLocks noGrp="1"/>
-          </p:cNvSpPr>
-          <p:nvPr>
-            <p:ph type="sldNum" sz="quarter" idx="14"/>
-          </p:nvPr>
-        </p:nvSpPr>
-        <p:spPr/>
-        <p:txBody>
-          <a:bodyPr/>
-          <a:lstStyle/>
-          <a:p>
-            <a:fld id="{4506F84E-75D2-4715-B6C6-C971E49CE21A}" type="slidenum">
-              <a:rPr lang="de-DE" smtClean="0"/>
-              <a:pPr/>
-              <a:t>13</a:t>
-            </a:fld>
-            <a:endParaRPr lang="de-DE" dirty="0"/>
-          </a:p>
-        </p:txBody>
-      </p:sp>
-    </p:spTree>
-    <p:extLst>
-      <p:ext uri="{BB962C8B-B14F-4D97-AF65-F5344CB8AC3E}">
-        <p14:creationId xmlns:p14="http://schemas.microsoft.com/office/powerpoint/2010/main" val="361520676"/>
-      </p:ext>
-    </p:extLst>
-  </p:cSld>
-  <p:clrMapOvr>
-    <a:masterClrMapping/>
-  </p:clrMapOvr>
-</p:sld>
-</file>
-
-<file path=ppt/slides/slide14.xml><?xml version="1.0" encoding="utf-8"?>
-<p:sld xmlns:a="http://schemas.openxmlformats.org/drawingml/2006/main" xmlns:r="http://schemas.openxmlformats.org/officeDocument/2006/relationships" xmlns:p="http://schemas.openxmlformats.org/presentationml/2006/main">
-  <p:cSld>
-    <p:spTree>
-      <p:nvGrpSpPr>
-        <p:cNvPr id="1" name=""/>
-        <p:cNvGrpSpPr/>
-        <p:nvPr/>
-      </p:nvGrpSpPr>
-      <p:grpSpPr>
-        <a:xfrm>
-          <a:off x="0" y="0"/>
-          <a:ext cx="0" cy="0"/>
-          <a:chOff x="0" y="0"/>
-          <a:chExt cx="0" cy="0"/>
-        </a:xfrm>
-      </p:grpSpPr>
-      <p:sp>
-        <p:nvSpPr>
           <p:cNvPr id="2" name="Title 1"/>
           <p:cNvSpPr>
             <a:spLocks noGrp="1"/>
@@ -4932,7 +4743,7 @@
             <a:fld id="{4506F84E-75D2-4715-B6C6-C971E49CE21A}" type="slidenum">
               <a:rPr lang="de-DE" smtClean="0"/>
               <a:pPr/>
-              <a:t>14</a:t>
+              <a:t>13</a:t>
             </a:fld>
             <a:endParaRPr lang="de-DE" dirty="0"/>
           </a:p>
@@ -4981,7 +4792,7 @@
 </p:sld>
 </file>
 
-<file path=ppt/slides/slide15.xml><?xml version="1.0" encoding="utf-8"?>
+<file path=ppt/slides/slide14.xml><?xml version="1.0" encoding="utf-8"?>
 <p:sld xmlns:a="http://schemas.openxmlformats.org/drawingml/2006/main" xmlns:r="http://schemas.openxmlformats.org/officeDocument/2006/relationships" xmlns:p="http://schemas.openxmlformats.org/presentationml/2006/main">
   <p:cSld>
     <p:spTree>
@@ -5063,7 +4874,7 @@
             <a:fld id="{4506F84E-75D2-4715-B6C6-C971E49CE21A}" type="slidenum">
               <a:rPr lang="de-DE" smtClean="0"/>
               <a:pPr/>
-              <a:t>15</a:t>
+              <a:t>14</a:t>
             </a:fld>
             <a:endParaRPr lang="de-DE" dirty="0"/>
           </a:p>
@@ -6021,6 +5832,71 @@
 </p:sld>
 </file>
 
+<file path=ppt/slides/slide15.xml><?xml version="1.0" encoding="utf-8"?>
+<p:sld xmlns:a="http://schemas.openxmlformats.org/drawingml/2006/main" xmlns:r="http://schemas.openxmlformats.org/officeDocument/2006/relationships" xmlns:p="http://schemas.openxmlformats.org/presentationml/2006/main">
+  <p:cSld>
+    <p:spTree>
+      <p:nvGrpSpPr>
+        <p:cNvPr id="1" name=""/>
+        <p:cNvGrpSpPr/>
+        <p:nvPr/>
+      </p:nvGrpSpPr>
+      <p:grpSpPr>
+        <a:xfrm>
+          <a:off x="0" y="0"/>
+          <a:ext cx="0" cy="0"/>
+          <a:chOff x="0" y="0"/>
+          <a:chExt cx="0" cy="0"/>
+        </a:xfrm>
+      </p:grpSpPr>
+      <p:sp>
+        <p:nvSpPr>
+          <p:cNvPr id="2" name="Titel 1"/>
+          <p:cNvSpPr>
+            <a:spLocks noGrp="1"/>
+          </p:cNvSpPr>
+          <p:nvPr>
+            <p:ph type="ctrTitle"/>
+          </p:nvPr>
+        </p:nvSpPr>
+        <p:spPr>
+          <a:xfrm>
+            <a:off x="384000" y="2487600"/>
+            <a:ext cx="11424000" cy="443198"/>
+          </a:xfrm>
+        </p:spPr>
+        <p:txBody>
+          <a:bodyPr/>
+          <a:lstStyle/>
+          <a:p>
+            <a:r>
+              <a:rPr lang="en-US" dirty="0"/>
+              <a:t>Features </a:t>
+            </a:r>
+            <a:r>
+              <a:rPr lang="en-US" dirty="0" err="1"/>
+              <a:t>für</a:t>
+            </a:r>
+            <a:r>
+              <a:rPr lang="en-US" dirty="0"/>
+              <a:t> Beta Version</a:t>
+            </a:r>
+          </a:p>
+        </p:txBody>
+      </p:sp>
+    </p:spTree>
+    <p:extLst>
+      <p:ext uri="{BB962C8B-B14F-4D97-AF65-F5344CB8AC3E}">
+        <p14:creationId xmlns:p14="http://schemas.microsoft.com/office/powerpoint/2010/main" val="4250935669"/>
+      </p:ext>
+    </p:extLst>
+  </p:cSld>
+  <p:clrMapOvr>
+    <a:masterClrMapping/>
+  </p:clrMapOvr>
+</p:sld>
+</file>
+
 <file path=ppt/slides/slide16.xml><?xml version="1.0" encoding="utf-8"?>
 <p:sld xmlns:a="http://schemas.openxmlformats.org/drawingml/2006/main" xmlns:r="http://schemas.openxmlformats.org/officeDocument/2006/relationships" xmlns:p="http://schemas.openxmlformats.org/presentationml/2006/main">
   <p:cSld>
@@ -6040,71 +5916,6 @@
       </p:grpSpPr>
       <p:sp>
         <p:nvSpPr>
-          <p:cNvPr id="2" name="Titel 1"/>
-          <p:cNvSpPr>
-            <a:spLocks noGrp="1"/>
-          </p:cNvSpPr>
-          <p:nvPr>
-            <p:ph type="ctrTitle"/>
-          </p:nvPr>
-        </p:nvSpPr>
-        <p:spPr>
-          <a:xfrm>
-            <a:off x="384000" y="2487600"/>
-            <a:ext cx="11424000" cy="443198"/>
-          </a:xfrm>
-        </p:spPr>
-        <p:txBody>
-          <a:bodyPr/>
-          <a:lstStyle/>
-          <a:p>
-            <a:r>
-              <a:rPr lang="en-US" dirty="0"/>
-              <a:t>Features </a:t>
-            </a:r>
-            <a:r>
-              <a:rPr lang="en-US" dirty="0" err="1"/>
-              <a:t>für</a:t>
-            </a:r>
-            <a:r>
-              <a:rPr lang="en-US" dirty="0"/>
-              <a:t> Beta Version</a:t>
-            </a:r>
-          </a:p>
-        </p:txBody>
-      </p:sp>
-    </p:spTree>
-    <p:extLst>
-      <p:ext uri="{BB962C8B-B14F-4D97-AF65-F5344CB8AC3E}">
-        <p14:creationId xmlns:p14="http://schemas.microsoft.com/office/powerpoint/2010/main" val="4250935669"/>
-      </p:ext>
-    </p:extLst>
-  </p:cSld>
-  <p:clrMapOvr>
-    <a:masterClrMapping/>
-  </p:clrMapOvr>
-</p:sld>
-</file>
-
-<file path=ppt/slides/slide17.xml><?xml version="1.0" encoding="utf-8"?>
-<p:sld xmlns:a="http://schemas.openxmlformats.org/drawingml/2006/main" xmlns:r="http://schemas.openxmlformats.org/officeDocument/2006/relationships" xmlns:p="http://schemas.openxmlformats.org/presentationml/2006/main">
-  <p:cSld>
-    <p:spTree>
-      <p:nvGrpSpPr>
-        <p:cNvPr id="1" name=""/>
-        <p:cNvGrpSpPr/>
-        <p:nvPr/>
-      </p:nvGrpSpPr>
-      <p:grpSpPr>
-        <a:xfrm>
-          <a:off x="0" y="0"/>
-          <a:ext cx="0" cy="0"/>
-          <a:chOff x="0" y="0"/>
-          <a:chExt cx="0" cy="0"/>
-        </a:xfrm>
-      </p:grpSpPr>
-      <p:sp>
-        <p:nvSpPr>
           <p:cNvPr id="5" name="Title 4"/>
           <p:cNvSpPr>
             <a:spLocks noGrp="1"/>
@@ -6282,7 +6093,7 @@
             <a:fld id="{4506F84E-75D2-4715-B6C6-C971E49CE21A}" type="slidenum">
               <a:rPr lang="de-DE" smtClean="0"/>
               <a:pPr/>
-              <a:t>17</a:t>
+              <a:t>16</a:t>
             </a:fld>
             <a:endParaRPr lang="de-DE" dirty="0"/>
           </a:p>
@@ -6301,7 +6112,7 @@
 </p:sld>
 </file>
 
-<file path=ppt/slides/slide18.xml><?xml version="1.0" encoding="utf-8"?>
+<file path=ppt/slides/slide17.xml><?xml version="1.0" encoding="utf-8"?>
 <p:sld xmlns:a="http://schemas.openxmlformats.org/drawingml/2006/main" xmlns:r="http://schemas.openxmlformats.org/officeDocument/2006/relationships" xmlns:p="http://schemas.openxmlformats.org/presentationml/2006/main">
   <p:cSld>
     <p:spTree>
@@ -6440,7 +6251,7 @@
             </a:pPr>
             <a:r>
               <a:rPr lang="en-US" dirty="0"/>
-              <a:t>Web </a:t>
+              <a:t>Web-</a:t>
             </a:r>
             <a:r>
               <a:rPr lang="en-US" dirty="0" err="1"/>
@@ -6947,7 +6758,7 @@
             <a:pPr lvl="1"/>
             <a:r>
               <a:rPr lang="en-US" b="1" dirty="0"/>
-              <a:t> Communication: </a:t>
+              <a:t>Communication: </a:t>
             </a:r>
             <a:r>
               <a:rPr lang="en-US" dirty="0"/>
@@ -8205,7 +8016,7 @@
             <a:pPr lvl="1"/>
             <a:r>
               <a:rPr lang="en-US" dirty="0"/>
-              <a:t> AngularJS based</a:t>
+              <a:t>AngularJS based</a:t>
             </a:r>
           </a:p>
           <a:p>
@@ -8352,139 +8163,35 @@
       </p:grpSpPr>
       <p:sp>
         <p:nvSpPr>
-          <p:cNvPr id="5" name="Title 4"/>
+          <p:cNvPr id="2" name="Titel 1"/>
           <p:cNvSpPr>
             <a:spLocks noGrp="1"/>
           </p:cNvSpPr>
           <p:nvPr>
-            <p:ph type="title"/>
-          </p:nvPr>
-        </p:nvSpPr>
-        <p:spPr/>
+            <p:ph type="ctrTitle"/>
+          </p:nvPr>
+        </p:nvSpPr>
+        <p:spPr>
+          <a:xfrm>
+            <a:off x="384000" y="2487600"/>
+            <a:ext cx="11424000" cy="443198"/>
+          </a:xfrm>
+        </p:spPr>
         <p:txBody>
           <a:bodyPr/>
           <a:lstStyle/>
           <a:p>
             <a:r>
               <a:rPr lang="en-US" dirty="0"/>
-              <a:t>Frontend</a:t>
-            </a:r>
-          </a:p>
-        </p:txBody>
-      </p:sp>
-      <p:sp>
-        <p:nvSpPr>
-          <p:cNvPr id="6" name="Content Placeholder 5"/>
-          <p:cNvSpPr>
-            <a:spLocks noGrp="1"/>
-          </p:cNvSpPr>
-          <p:nvPr>
-            <p:ph sz="quarter" idx="12"/>
-          </p:nvPr>
-        </p:nvSpPr>
-        <p:spPr>
-          <a:xfrm>
-            <a:off x="306460" y="2699396"/>
-            <a:ext cx="11425764" cy="621788"/>
-          </a:xfrm>
-        </p:spPr>
-        <p:txBody>
-          <a:bodyPr>
-            <a:noAutofit/>
-          </a:bodyPr>
-          <a:lstStyle/>
-          <a:p>
-            <a:pPr marL="0" lvl="1" indent="0" algn="ctr">
-              <a:buNone/>
-            </a:pPr>
-            <a:endParaRPr lang="en-US" sz="1000" dirty="0"/>
-          </a:p>
-          <a:p>
-            <a:pPr marL="0" lvl="1" indent="0" algn="ctr">
-              <a:buNone/>
-            </a:pPr>
-            <a:r>
-              <a:rPr lang="en-US" sz="5400" dirty="0" err="1"/>
-              <a:t>Livedemo</a:t>
-            </a:r>
-            <a:endParaRPr lang="en-US" sz="5400" dirty="0"/>
-          </a:p>
-          <a:p>
-            <a:pPr marL="0" lvl="1" indent="0">
-              <a:buNone/>
-            </a:pPr>
-            <a:r>
-              <a:rPr lang="en-US" sz="1000" dirty="0"/>
-              <a:t>                                                                                                               </a:t>
-            </a:r>
-          </a:p>
-          <a:p>
-            <a:pPr marL="0" lvl="1" indent="0">
-              <a:buNone/>
-            </a:pPr>
-            <a:r>
-              <a:rPr lang="en-US" sz="1000" dirty="0"/>
-              <a:t>                                                                                                                                                                          </a:t>
-            </a:r>
-          </a:p>
-          <a:p>
-            <a:pPr marL="0" lvl="1" indent="0">
-              <a:buNone/>
-            </a:pPr>
-            <a:r>
-              <a:rPr lang="en-US" sz="1000" dirty="0"/>
-              <a:t>                                                                                                        </a:t>
-            </a:r>
-          </a:p>
-        </p:txBody>
-      </p:sp>
-      <p:sp>
-        <p:nvSpPr>
-          <p:cNvPr id="3" name="Footer Placeholder 2"/>
-          <p:cNvSpPr>
-            <a:spLocks noGrp="1"/>
-          </p:cNvSpPr>
-          <p:nvPr>
-            <p:ph type="ftr" sz="quarter" idx="13"/>
-          </p:nvPr>
-        </p:nvSpPr>
-        <p:spPr/>
-        <p:txBody>
-          <a:bodyPr/>
-          <a:lstStyle/>
-          <a:p>
-            <a:endParaRPr lang="de-DE" dirty="0"/>
-          </a:p>
-        </p:txBody>
-      </p:sp>
-      <p:sp>
-        <p:nvSpPr>
-          <p:cNvPr id="4" name="Slide Number Placeholder 3"/>
-          <p:cNvSpPr>
-            <a:spLocks noGrp="1"/>
-          </p:cNvSpPr>
-          <p:nvPr>
-            <p:ph type="sldNum" sz="quarter" idx="14"/>
-          </p:nvPr>
-        </p:nvSpPr>
-        <p:spPr/>
-        <p:txBody>
-          <a:bodyPr/>
-          <a:lstStyle/>
-          <a:p>
-            <a:fld id="{4506F84E-75D2-4715-B6C6-C971E49CE21A}" type="slidenum">
-              <a:rPr lang="de-DE" smtClean="0"/>
-              <a:pPr/>
-              <a:t>8</a:t>
-            </a:fld>
-            <a:endParaRPr lang="de-DE" dirty="0"/>
+              <a:t>API</a:t>
+            </a:r>
           </a:p>
         </p:txBody>
       </p:sp>
     </p:spTree>
     <p:extLst>
       <p:ext uri="{BB962C8B-B14F-4D97-AF65-F5344CB8AC3E}">
-        <p14:creationId xmlns:p14="http://schemas.microsoft.com/office/powerpoint/2010/main" val="1444842059"/>
+        <p14:creationId xmlns:p14="http://schemas.microsoft.com/office/powerpoint/2010/main" val="3301941064"/>
       </p:ext>
     </p:extLst>
   </p:cSld>
@@ -8513,35 +8220,166 @@
       </p:grpSpPr>
       <p:sp>
         <p:nvSpPr>
-          <p:cNvPr id="2" name="Titel 1"/>
+          <p:cNvPr id="5" name="Title 4"/>
           <p:cNvSpPr>
             <a:spLocks noGrp="1"/>
           </p:cNvSpPr>
           <p:nvPr>
-            <p:ph type="ctrTitle"/>
-          </p:nvPr>
-        </p:nvSpPr>
+            <p:ph type="title"/>
+          </p:nvPr>
+        </p:nvSpPr>
+        <p:spPr/>
+        <p:txBody>
+          <a:bodyPr/>
+          <a:lstStyle/>
+          <a:p>
+            <a:r>
+              <a:rPr lang="en-US" dirty="0"/>
+              <a:t>API</a:t>
+            </a:r>
+          </a:p>
+        </p:txBody>
+      </p:sp>
+      <p:sp>
+        <p:nvSpPr>
+          <p:cNvPr id="6" name="Content Placeholder 5"/>
+          <p:cNvSpPr>
+            <a:spLocks noGrp="1"/>
+          </p:cNvSpPr>
+          <p:nvPr>
+            <p:ph sz="quarter" idx="12"/>
+          </p:nvPr>
+        </p:nvSpPr>
+        <p:spPr/>
+        <p:txBody>
+          <a:bodyPr/>
+          <a:lstStyle/>
+          <a:p>
+            <a:pPr marL="0" lvl="1" indent="0">
+              <a:buNone/>
+            </a:pPr>
+            <a:r>
+              <a:rPr lang="en-US" dirty="0"/>
+              <a:t> Swagger </a:t>
+            </a:r>
+            <a:r>
+              <a:rPr lang="en-US" dirty="0" err="1"/>
+              <a:t>Doku</a:t>
+            </a:r>
+            <a:endParaRPr lang="en-US" dirty="0"/>
+          </a:p>
+          <a:p>
+            <a:pPr marL="0" lvl="1" indent="0">
+              <a:buNone/>
+            </a:pPr>
+            <a:endParaRPr lang="en-US" dirty="0"/>
+          </a:p>
+          <a:p>
+            <a:pPr marL="0" lvl="1" indent="0">
+              <a:buNone/>
+            </a:pPr>
+            <a:r>
+              <a:rPr lang="en-US" dirty="0"/>
+              <a:t>                                                                                                               </a:t>
+            </a:r>
+          </a:p>
+          <a:p>
+            <a:pPr marL="0" lvl="1" indent="0">
+              <a:buNone/>
+            </a:pPr>
+            <a:r>
+              <a:rPr lang="en-US" dirty="0"/>
+              <a:t>                                                                                                                                                                          </a:t>
+            </a:r>
+          </a:p>
+          <a:p>
+            <a:pPr marL="0" lvl="1" indent="0">
+              <a:buNone/>
+            </a:pPr>
+            <a:r>
+              <a:rPr lang="en-US" dirty="0"/>
+              <a:t>                                                                                                         </a:t>
+            </a:r>
+          </a:p>
+        </p:txBody>
+      </p:sp>
+      <p:sp>
+        <p:nvSpPr>
+          <p:cNvPr id="3" name="Footer Placeholder 2"/>
+          <p:cNvSpPr>
+            <a:spLocks noGrp="1"/>
+          </p:cNvSpPr>
+          <p:nvPr>
+            <p:ph type="ftr" sz="quarter" idx="13"/>
+          </p:nvPr>
+        </p:nvSpPr>
+        <p:spPr/>
+        <p:txBody>
+          <a:bodyPr/>
+          <a:lstStyle/>
+          <a:p>
+            <a:endParaRPr lang="de-DE" dirty="0"/>
+          </a:p>
+        </p:txBody>
+      </p:sp>
+      <p:sp>
+        <p:nvSpPr>
+          <p:cNvPr id="4" name="Slide Number Placeholder 3"/>
+          <p:cNvSpPr>
+            <a:spLocks noGrp="1"/>
+          </p:cNvSpPr>
+          <p:nvPr>
+            <p:ph type="sldNum" sz="quarter" idx="14"/>
+          </p:nvPr>
+        </p:nvSpPr>
+        <p:spPr/>
+        <p:txBody>
+          <a:bodyPr/>
+          <a:lstStyle/>
+          <a:p>
+            <a:fld id="{4506F84E-75D2-4715-B6C6-C971E49CE21A}" type="slidenum">
+              <a:rPr lang="de-DE" smtClean="0"/>
+              <a:pPr/>
+              <a:t>9</a:t>
+            </a:fld>
+            <a:endParaRPr lang="de-DE" dirty="0"/>
+          </a:p>
+        </p:txBody>
+      </p:sp>
+      <p:pic>
+        <p:nvPicPr>
+          <p:cNvPr id="7" name="Grafik 6"/>
+          <p:cNvPicPr>
+            <a:picLocks noChangeAspect="1"/>
+          </p:cNvPicPr>
+          <p:nvPr/>
+        </p:nvPicPr>
+        <p:blipFill>
+          <a:blip r:embed="rId2" cstate="print">
+            <a:extLst>
+              <a:ext uri="{28A0092B-C50C-407E-A947-70E740481C1C}">
+                <a14:useLocalDpi xmlns:a14="http://schemas.microsoft.com/office/drawing/2010/main" val="0"/>
+              </a:ext>
+            </a:extLst>
+          </a:blip>
+          <a:stretch>
+            <a:fillRect/>
+          </a:stretch>
+        </p:blipFill>
         <p:spPr>
           <a:xfrm>
-            <a:off x="384000" y="2487600"/>
-            <a:ext cx="11424000" cy="443198"/>
+            <a:off x="352904" y="1380930"/>
+            <a:ext cx="8822198" cy="4414342"/>
           </a:xfrm>
+          <a:prstGeom prst="rect">
+            <a:avLst/>
+          </a:prstGeom>
         </p:spPr>
-        <p:txBody>
-          <a:bodyPr/>
-          <a:lstStyle/>
-          <a:p>
-            <a:r>
-              <a:rPr lang="en-US" dirty="0"/>
-              <a:t>API</a:t>
-            </a:r>
-          </a:p>
-        </p:txBody>
-      </p:sp>
+      </p:pic>
     </p:spTree>
     <p:extLst>
       <p:ext uri="{BB962C8B-B14F-4D97-AF65-F5344CB8AC3E}">
-        <p14:creationId xmlns:p14="http://schemas.microsoft.com/office/powerpoint/2010/main" val="3301941064"/>
+        <p14:creationId xmlns:p14="http://schemas.microsoft.com/office/powerpoint/2010/main" val="780322075"/>
       </p:ext>
     </p:extLst>
   </p:cSld>

</xml_diff>